<commit_message>
Powerpoint writer: update golden test files
Since the template changed, some small elements of these test files
changed as well.

All of these were checked with Powerpoint 2013 on Windows
10 (VirtualBox). All had expected outcomes and no corruption.
</commit_message>
<xml_diff>
--- a/test/pptx/endnotes.pptx
+++ b/test/pptx/endnotes.pptx
@@ -105,6 +105,22 @@
       </a:defRPr>
     </a:lvl9pPr>
   </p:defaultTextStyle>
+  <p:extLst>
+    <p:ext uri="{EFAFB233-063F-42B5-8137-9DF3F51BA10A}">
+      <p15:sldGuideLst xmlns:p15="http://schemas.microsoft.com/office/powerpoint/2012/main">
+        <p15:guide id="1" orient="horz" pos="2160">
+          <p15:clr>
+            <a:srgbClr val="A4A3A4"/>
+          </p15:clr>
+        </p15:guide>
+        <p15:guide id="2" pos="2880">
+          <p15:clr>
+            <a:srgbClr val="A4A3A4"/>
+          </p15:clr>
+        </p15:guide>
+      </p15:sldGuideLst>
+    </p:ext>
+  </p:extLst>
 </p:presentation>
 </file>
 
@@ -289,7 +305,7 @@
           <a:p>
             <a:fld id="{241EB5C9-1307-BA42-ABA2-0BC069CD8E7F}" type="datetimeFigureOut">
               <a:rPr lang="en-US" smtClean="0"/>
-              <a:t>6/5/17</a:t>
+              <a:t>2/17/2018</a:t>
             </a:fld>
             <a:endParaRPr lang="en-US"/>
           </a:p>
@@ -459,7 +475,7 @@
           <a:p>
             <a:fld id="{241EB5C9-1307-BA42-ABA2-0BC069CD8E7F}" type="datetimeFigureOut">
               <a:rPr lang="en-US" smtClean="0"/>
-              <a:t>6/5/17</a:t>
+              <a:t>2/17/2018</a:t>
             </a:fld>
             <a:endParaRPr lang="en-US"/>
           </a:p>
@@ -639,7 +655,7 @@
           <a:p>
             <a:fld id="{241EB5C9-1307-BA42-ABA2-0BC069CD8E7F}" type="datetimeFigureOut">
               <a:rPr lang="en-US" smtClean="0"/>
-              <a:t>6/5/17</a:t>
+              <a:t>2/17/2018</a:t>
             </a:fld>
             <a:endParaRPr lang="en-US"/>
           </a:p>
@@ -809,7 +825,7 @@
           <a:p>
             <a:fld id="{241EB5C9-1307-BA42-ABA2-0BC069CD8E7F}" type="datetimeFigureOut">
               <a:rPr lang="en-US" smtClean="0"/>
-              <a:t>6/5/17</a:t>
+              <a:t>2/17/2018</a:t>
             </a:fld>
             <a:endParaRPr lang="en-US"/>
           </a:p>
@@ -1055,7 +1071,7 @@
           <a:p>
             <a:fld id="{241EB5C9-1307-BA42-ABA2-0BC069CD8E7F}" type="datetimeFigureOut">
               <a:rPr lang="en-US" smtClean="0"/>
-              <a:t>6/5/17</a:t>
+              <a:t>2/17/2018</a:t>
             </a:fld>
             <a:endParaRPr lang="en-US"/>
           </a:p>
@@ -1343,7 +1359,7 @@
           <a:p>
             <a:fld id="{241EB5C9-1307-BA42-ABA2-0BC069CD8E7F}" type="datetimeFigureOut">
               <a:rPr lang="en-US" smtClean="0"/>
-              <a:t>6/5/17</a:t>
+              <a:t>2/17/2018</a:t>
             </a:fld>
             <a:endParaRPr lang="en-US"/>
           </a:p>
@@ -1765,7 +1781,7 @@
           <a:p>
             <a:fld id="{241EB5C9-1307-BA42-ABA2-0BC069CD8E7F}" type="datetimeFigureOut">
               <a:rPr lang="en-US" smtClean="0"/>
-              <a:t>6/5/17</a:t>
+              <a:t>2/17/2018</a:t>
             </a:fld>
             <a:endParaRPr lang="en-US"/>
           </a:p>
@@ -1883,7 +1899,7 @@
           <a:p>
             <a:fld id="{241EB5C9-1307-BA42-ABA2-0BC069CD8E7F}" type="datetimeFigureOut">
               <a:rPr lang="en-US" smtClean="0"/>
-              <a:t>6/5/17</a:t>
+              <a:t>2/17/2018</a:t>
             </a:fld>
             <a:endParaRPr lang="en-US"/>
           </a:p>
@@ -1978,7 +1994,7 @@
           <a:p>
             <a:fld id="{241EB5C9-1307-BA42-ABA2-0BC069CD8E7F}" type="datetimeFigureOut">
               <a:rPr lang="en-US" smtClean="0"/>
-              <a:t>6/5/17</a:t>
+              <a:t>2/17/2018</a:t>
             </a:fld>
             <a:endParaRPr lang="en-US"/>
           </a:p>
@@ -2255,7 +2271,7 @@
           <a:p>
             <a:fld id="{241EB5C9-1307-BA42-ABA2-0BC069CD8E7F}" type="datetimeFigureOut">
               <a:rPr lang="en-US" smtClean="0"/>
-              <a:t>6/5/17</a:t>
+              <a:t>2/17/2018</a:t>
             </a:fld>
             <a:endParaRPr lang="en-US"/>
           </a:p>
@@ -2508,7 +2524,7 @@
           <a:p>
             <a:fld id="{241EB5C9-1307-BA42-ABA2-0BC069CD8E7F}" type="datetimeFigureOut">
               <a:rPr lang="en-US" smtClean="0"/>
-              <a:t>6/5/17</a:t>
+              <a:t>2/17/2018</a:t>
             </a:fld>
             <a:endParaRPr lang="en-US"/>
           </a:p>
@@ -2721,7 +2737,7 @@
           <a:p>
             <a:fld id="{241EB5C9-1307-BA42-ABA2-0BC069CD8E7F}" type="datetimeFigureOut">
               <a:rPr lang="en-US" smtClean="0"/>
-              <a:t>6/5/17</a:t>
+              <a:t>2/17/2018</a:t>
             </a:fld>
             <a:endParaRPr lang="en-US"/>
           </a:p>

</xml_diff>